<commit_message>
huge change but i was missed
find best sigma weight testing -> on brute-forcing, but i will change dfs with pruning
</commit_message>
<xml_diff>
--- a/Documents/rpc/rpc.pptx
+++ b/Documents/rpc/rpc.pptx
@@ -6,6 +6,8 @@
   </p:sldMasterIdLst>
   <p:sldIdLst>
     <p:sldId id="256" r:id="rId2"/>
+    <p:sldId id="257" r:id="rId3"/>
+    <p:sldId id="258" r:id="rId4"/>
   </p:sldIdLst>
   <p:sldSz cx="12192000" cy="6858000"/>
   <p:notesSz cx="6858000" cy="9144000"/>
@@ -243,7 +245,7 @@
           <a:p>
             <a:fld id="{C79FC548-1B58-439E-83C4-DC199C6DD18E}" type="datetimeFigureOut">
               <a:rPr lang="ko-KR" altLang="en-US" smtClean="0"/>
-              <a:t>2015-05-25</a:t>
+              <a:t>2015-05-29</a:t>
             </a:fld>
             <a:endParaRPr lang="ko-KR" altLang="en-US"/>
           </a:p>
@@ -413,7 +415,7 @@
           <a:p>
             <a:fld id="{C79FC548-1B58-439E-83C4-DC199C6DD18E}" type="datetimeFigureOut">
               <a:rPr lang="ko-KR" altLang="en-US" smtClean="0"/>
-              <a:t>2015-05-25</a:t>
+              <a:t>2015-05-29</a:t>
             </a:fld>
             <a:endParaRPr lang="ko-KR" altLang="en-US"/>
           </a:p>
@@ -593,7 +595,7 @@
           <a:p>
             <a:fld id="{C79FC548-1B58-439E-83C4-DC199C6DD18E}" type="datetimeFigureOut">
               <a:rPr lang="ko-KR" altLang="en-US" smtClean="0"/>
-              <a:t>2015-05-25</a:t>
+              <a:t>2015-05-29</a:t>
             </a:fld>
             <a:endParaRPr lang="ko-KR" altLang="en-US"/>
           </a:p>
@@ -763,7 +765,7 @@
           <a:p>
             <a:fld id="{C79FC548-1B58-439E-83C4-DC199C6DD18E}" type="datetimeFigureOut">
               <a:rPr lang="ko-KR" altLang="en-US" smtClean="0"/>
-              <a:t>2015-05-25</a:t>
+              <a:t>2015-05-29</a:t>
             </a:fld>
             <a:endParaRPr lang="ko-KR" altLang="en-US"/>
           </a:p>
@@ -1009,7 +1011,7 @@
           <a:p>
             <a:fld id="{C79FC548-1B58-439E-83C4-DC199C6DD18E}" type="datetimeFigureOut">
               <a:rPr lang="ko-KR" altLang="en-US" smtClean="0"/>
-              <a:t>2015-05-25</a:t>
+              <a:t>2015-05-29</a:t>
             </a:fld>
             <a:endParaRPr lang="ko-KR" altLang="en-US"/>
           </a:p>
@@ -1241,7 +1243,7 @@
           <a:p>
             <a:fld id="{C79FC548-1B58-439E-83C4-DC199C6DD18E}" type="datetimeFigureOut">
               <a:rPr lang="ko-KR" altLang="en-US" smtClean="0"/>
-              <a:t>2015-05-25</a:t>
+              <a:t>2015-05-29</a:t>
             </a:fld>
             <a:endParaRPr lang="ko-KR" altLang="en-US"/>
           </a:p>
@@ -1608,7 +1610,7 @@
           <a:p>
             <a:fld id="{C79FC548-1B58-439E-83C4-DC199C6DD18E}" type="datetimeFigureOut">
               <a:rPr lang="ko-KR" altLang="en-US" smtClean="0"/>
-              <a:t>2015-05-25</a:t>
+              <a:t>2015-05-29</a:t>
             </a:fld>
             <a:endParaRPr lang="ko-KR" altLang="en-US"/>
           </a:p>
@@ -1726,7 +1728,7 @@
           <a:p>
             <a:fld id="{C79FC548-1B58-439E-83C4-DC199C6DD18E}" type="datetimeFigureOut">
               <a:rPr lang="ko-KR" altLang="en-US" smtClean="0"/>
-              <a:t>2015-05-25</a:t>
+              <a:t>2015-05-29</a:t>
             </a:fld>
             <a:endParaRPr lang="ko-KR" altLang="en-US"/>
           </a:p>
@@ -1821,7 +1823,7 @@
           <a:p>
             <a:fld id="{C79FC548-1B58-439E-83C4-DC199C6DD18E}" type="datetimeFigureOut">
               <a:rPr lang="ko-KR" altLang="en-US" smtClean="0"/>
-              <a:t>2015-05-25</a:t>
+              <a:t>2015-05-29</a:t>
             </a:fld>
             <a:endParaRPr lang="ko-KR" altLang="en-US"/>
           </a:p>
@@ -2098,7 +2100,7 @@
           <a:p>
             <a:fld id="{C79FC548-1B58-439E-83C4-DC199C6DD18E}" type="datetimeFigureOut">
               <a:rPr lang="ko-KR" altLang="en-US" smtClean="0"/>
-              <a:t>2015-05-25</a:t>
+              <a:t>2015-05-29</a:t>
             </a:fld>
             <a:endParaRPr lang="ko-KR" altLang="en-US"/>
           </a:p>
@@ -2351,7 +2353,7 @@
           <a:p>
             <a:fld id="{C79FC548-1B58-439E-83C4-DC199C6DD18E}" type="datetimeFigureOut">
               <a:rPr lang="ko-KR" altLang="en-US" smtClean="0"/>
-              <a:t>2015-05-25</a:t>
+              <a:t>2015-05-29</a:t>
             </a:fld>
             <a:endParaRPr lang="ko-KR" altLang="en-US"/>
           </a:p>
@@ -2564,7 +2566,7 @@
           <a:p>
             <a:fld id="{C79FC548-1B58-439E-83C4-DC199C6DD18E}" type="datetimeFigureOut">
               <a:rPr lang="ko-KR" altLang="en-US" smtClean="0"/>
-              <a:t>2015-05-25</a:t>
+              <a:t>2015-05-29</a:t>
             </a:fld>
             <a:endParaRPr lang="ko-KR" altLang="en-US"/>
           </a:p>
@@ -2977,8 +2979,8 @@
         </p:nvSpPr>
         <p:spPr>
           <a:xfrm>
-            <a:off x="349251" y="3695700"/>
-            <a:ext cx="4953000" cy="1739900"/>
+            <a:off x="0" y="0"/>
+            <a:ext cx="140043" cy="164757"/>
           </a:xfrm>
           <a:prstGeom prst="rect">
             <a:avLst/>
@@ -3015,7 +3017,7 @@
         </p:nvSpPr>
         <p:spPr>
           <a:xfrm>
-            <a:off x="867732" y="5036374"/>
+            <a:off x="3517952" y="5044612"/>
             <a:ext cx="882507" cy="184666"/>
           </a:xfrm>
           <a:prstGeom prst="rect">
@@ -3053,7 +3055,7 @@
         </p:nvSpPr>
         <p:spPr>
           <a:xfrm>
-            <a:off x="3107548" y="5036630"/>
+            <a:off x="5757768" y="5044868"/>
             <a:ext cx="1324577" cy="184666"/>
           </a:xfrm>
           <a:prstGeom prst="rect">
@@ -3142,7 +3144,7 @@
         </p:nvSpPr>
         <p:spPr>
           <a:xfrm>
-            <a:off x="1804609" y="5036630"/>
+            <a:off x="4454829" y="5044868"/>
             <a:ext cx="1072983" cy="184666"/>
           </a:xfrm>
           <a:prstGeom prst="rect">
@@ -3181,7 +3183,7 @@
         </p:nvSpPr>
         <p:spPr>
           <a:xfrm>
-            <a:off x="1680330" y="4306136"/>
+            <a:off x="4330550" y="4314374"/>
             <a:ext cx="248559" cy="215263"/>
           </a:xfrm>
           <a:prstGeom prst="rightArrow">
@@ -3222,7 +3224,7 @@
         </p:nvSpPr>
         <p:spPr>
           <a:xfrm>
-            <a:off x="1053426" y="4052333"/>
+            <a:off x="3703646" y="4060571"/>
             <a:ext cx="511121" cy="722871"/>
           </a:xfrm>
           <a:prstGeom prst="foldedCorner">
@@ -3260,7 +3262,7 @@
         </p:nvSpPr>
         <p:spPr>
           <a:xfrm>
-            <a:off x="2587023" y="4007106"/>
+            <a:off x="5237243" y="4015344"/>
             <a:ext cx="150893" cy="123111"/>
           </a:xfrm>
           <a:prstGeom prst="rect">
@@ -3290,7 +3292,7 @@
         </p:nvSpPr>
         <p:spPr>
           <a:xfrm>
-            <a:off x="2587023" y="4290659"/>
+            <a:off x="5237243" y="4298897"/>
             <a:ext cx="461818" cy="123111"/>
           </a:xfrm>
           <a:prstGeom prst="rect">
@@ -3320,7 +3322,7 @@
         </p:nvSpPr>
         <p:spPr>
           <a:xfrm>
-            <a:off x="2587023" y="4578809"/>
+            <a:off x="5237243" y="4587047"/>
             <a:ext cx="461818" cy="123111"/>
           </a:xfrm>
           <a:prstGeom prst="rect">
@@ -3350,7 +3352,7 @@
         </p:nvCxnSpPr>
         <p:spPr>
           <a:xfrm>
-            <a:off x="2476223" y="4129379"/>
+            <a:off x="5126443" y="4137617"/>
             <a:ext cx="1074164" cy="0"/>
           </a:xfrm>
           <a:prstGeom prst="straightConnector1">
@@ -3383,7 +3385,7 @@
         </p:nvCxnSpPr>
         <p:spPr>
           <a:xfrm>
-            <a:off x="2476223" y="4432819"/>
+            <a:off x="5126443" y="4441057"/>
             <a:ext cx="1074165" cy="2"/>
           </a:xfrm>
           <a:prstGeom prst="straightConnector1">
@@ -3416,7 +3418,7 @@
         </p:nvCxnSpPr>
         <p:spPr>
           <a:xfrm>
-            <a:off x="2476223" y="4701920"/>
+            <a:off x="5126443" y="4710158"/>
             <a:ext cx="1074164" cy="0"/>
           </a:xfrm>
           <a:prstGeom prst="straightConnector1">
@@ -3441,8 +3443,8 @@
           </a:fontRef>
         </p:style>
       </p:cxnSp>
-      <mc:AlternateContent xmlns:mc="http://schemas.openxmlformats.org/markup-compatibility/2006" xmlns:a14="http://schemas.microsoft.com/office/drawing/2010/main">
-        <mc:Choice Requires="a14">
+      <mc:AlternateContent xmlns:mc="http://schemas.openxmlformats.org/markup-compatibility/2006">
+        <mc:Choice xmlns:a14="http://schemas.microsoft.com/office/drawing/2010/main" Requires="a14">
           <p:sp>
             <p:nvSpPr>
               <p:cNvPr id="63" name="TextBox 62"/>
@@ -3451,7 +3453,7 @@
             </p:nvSpPr>
             <p:spPr>
               <a:xfrm>
-                <a:off x="3305154" y="3975491"/>
+                <a:off x="5955374" y="3983729"/>
                 <a:ext cx="169405" cy="153888"/>
               </a:xfrm>
               <a:prstGeom prst="rect">
@@ -3505,7 +3507,7 @@
             </p:txBody>
           </p:sp>
         </mc:Choice>
-        <mc:Fallback xmlns="">
+        <mc:Fallback>
           <p:sp>
             <p:nvSpPr>
               <p:cNvPr id="63" name="TextBox 62"/>
@@ -3516,7 +3518,7 @@
             </p:nvSpPr>
             <p:spPr>
               <a:xfrm>
-                <a:off x="3305154" y="3975491"/>
+                <a:off x="5955374" y="3983729"/>
                 <a:ext cx="169405" cy="153888"/>
               </a:xfrm>
               <a:prstGeom prst="rect">
@@ -3525,7 +3527,7 @@
               <a:blipFill rotWithShape="0">
                 <a:blip r:embed="rId2"/>
                 <a:stretch>
-                  <a:fillRect l="-3571" r="-3571" b="-16000"/>
+                  <a:fillRect l="-7143" r="-3571" b="-15385"/>
                 </a:stretch>
               </a:blipFill>
             </p:spPr>
@@ -3544,8 +3546,8 @@
           </p:sp>
         </mc:Fallback>
       </mc:AlternateContent>
-      <mc:AlternateContent xmlns:mc="http://schemas.openxmlformats.org/markup-compatibility/2006" xmlns:a14="http://schemas.microsoft.com/office/drawing/2010/main">
-        <mc:Choice Requires="a14">
+      <mc:AlternateContent xmlns:mc="http://schemas.openxmlformats.org/markup-compatibility/2006">
+        <mc:Choice xmlns:a14="http://schemas.microsoft.com/office/drawing/2010/main" Requires="a14">
           <p:sp>
             <p:nvSpPr>
               <p:cNvPr id="64" name="TextBox 63"/>
@@ -3554,7 +3556,7 @@
             </p:nvSpPr>
             <p:spPr>
               <a:xfrm>
-                <a:off x="3302773" y="4265064"/>
+                <a:off x="5952993" y="4273302"/>
                 <a:ext cx="172355" cy="153888"/>
               </a:xfrm>
               <a:prstGeom prst="rect">
@@ -3608,7 +3610,7 @@
             </p:txBody>
           </p:sp>
         </mc:Choice>
-        <mc:Fallback xmlns="">
+        <mc:Fallback>
           <p:sp>
             <p:nvSpPr>
               <p:cNvPr id="64" name="TextBox 63"/>
@@ -3619,7 +3621,7 @@
             </p:nvSpPr>
             <p:spPr>
               <a:xfrm>
-                <a:off x="3302773" y="4265064"/>
+                <a:off x="5952993" y="4273302"/>
                 <a:ext cx="172355" cy="153888"/>
               </a:xfrm>
               <a:prstGeom prst="rect">
@@ -3647,8 +3649,8 @@
           </p:sp>
         </mc:Fallback>
       </mc:AlternateContent>
-      <mc:AlternateContent xmlns:mc="http://schemas.openxmlformats.org/markup-compatibility/2006" xmlns:a14="http://schemas.microsoft.com/office/drawing/2010/main">
-        <mc:Choice Requires="a14">
+      <mc:AlternateContent xmlns:mc="http://schemas.openxmlformats.org/markup-compatibility/2006">
+        <mc:Choice xmlns:a14="http://schemas.microsoft.com/office/drawing/2010/main" Requires="a14">
           <p:sp>
             <p:nvSpPr>
               <p:cNvPr id="65" name="TextBox 64"/>
@@ -3657,7 +3659,7 @@
             </p:nvSpPr>
             <p:spPr>
               <a:xfrm>
-                <a:off x="3299831" y="4550446"/>
+                <a:off x="5950051" y="4558684"/>
                 <a:ext cx="172355" cy="153888"/>
               </a:xfrm>
               <a:prstGeom prst="rect">
@@ -3711,7 +3713,7 @@
             </p:txBody>
           </p:sp>
         </mc:Choice>
-        <mc:Fallback xmlns="">
+        <mc:Fallback>
           <p:sp>
             <p:nvSpPr>
               <p:cNvPr id="65" name="TextBox 64"/>
@@ -3722,7 +3724,7 @@
             </p:nvSpPr>
             <p:spPr>
               <a:xfrm>
-                <a:off x="3299831" y="4550446"/>
+                <a:off x="5950051" y="4558684"/>
                 <a:ext cx="172355" cy="153888"/>
               </a:xfrm>
               <a:prstGeom prst="rect">
@@ -3731,7 +3733,7 @@
               <a:blipFill rotWithShape="0">
                 <a:blip r:embed="rId4"/>
                 <a:stretch>
-                  <a:fillRect l="-3448" b="-15385"/>
+                  <a:fillRect l="-3571" r="-3571" b="-16000"/>
                 </a:stretch>
               </a:blipFill>
             </p:spPr>
@@ -3841,7 +3843,7 @@
         </p:nvSpPr>
         <p:spPr>
           <a:xfrm>
-            <a:off x="4471695" y="4129379"/>
+            <a:off x="7121915" y="4137617"/>
             <a:ext cx="682350" cy="629800"/>
           </a:xfrm>
           <a:prstGeom prst="rect">
@@ -3883,7 +3885,7 @@
         </p:nvSpPr>
         <p:spPr>
           <a:xfrm rot="5400000">
-            <a:off x="3183059" y="4199257"/>
+            <a:off x="5833279" y="4207495"/>
             <a:ext cx="1184668" cy="429025"/>
           </a:xfrm>
           <a:prstGeom prst="flowChartManualOperation">
@@ -3921,7 +3923,7 @@
         </p:nvSpPr>
         <p:spPr>
           <a:xfrm flipH="1">
-            <a:off x="2066756" y="3862970"/>
+            <a:off x="4716976" y="3871208"/>
             <a:ext cx="409467" cy="974598"/>
           </a:xfrm>
           <a:prstGeom prst="flowChartManualInput">
@@ -3959,7 +3961,7 @@
         </p:nvSpPr>
         <p:spPr>
           <a:xfrm>
-            <a:off x="4102910" y="4306136"/>
+            <a:off x="6753130" y="4314374"/>
             <a:ext cx="248559" cy="215263"/>
           </a:xfrm>
           <a:prstGeom prst="rightArrow">
@@ -3996,6 +3998,992 @@
     <p:extLst>
       <p:ext uri="{BB962C8B-B14F-4D97-AF65-F5344CB8AC3E}">
         <p14:creationId xmlns:p14="http://schemas.microsoft.com/office/powerpoint/2010/main" val="2165242503"/>
+      </p:ext>
+    </p:extLst>
+  </p:cSld>
+  <p:clrMapOvr>
+    <a:masterClrMapping/>
+  </p:clrMapOvr>
+</p:sld>
+</file>
+
+<file path=ppt/slides/slide2.xml><?xml version="1.0" encoding="utf-8"?>
+<p:sld xmlns:a="http://schemas.openxmlformats.org/drawingml/2006/main" xmlns:r="http://schemas.openxmlformats.org/officeDocument/2006/relationships" xmlns:p="http://schemas.openxmlformats.org/presentationml/2006/main">
+  <p:cSld>
+    <p:spTree>
+      <p:nvGrpSpPr>
+        <p:cNvPr id="1" name=""/>
+        <p:cNvGrpSpPr/>
+        <p:nvPr/>
+      </p:nvGrpSpPr>
+      <p:grpSpPr>
+        <a:xfrm>
+          <a:off x="0" y="0"/>
+          <a:ext cx="0" cy="0"/>
+          <a:chOff x="0" y="0"/>
+          <a:chExt cx="0" cy="0"/>
+        </a:xfrm>
+      </p:grpSpPr>
+      <p:sp>
+        <p:nvSpPr>
+          <p:cNvPr id="4" name="직사각형 3"/>
+          <p:cNvSpPr/>
+          <p:nvPr/>
+        </p:nvSpPr>
+        <p:spPr>
+          <a:xfrm>
+            <a:off x="1512133" y="2656201"/>
+            <a:ext cx="5870873" cy="2613892"/>
+          </a:xfrm>
+          <a:prstGeom prst="rect">
+            <a:avLst/>
+          </a:prstGeom>
+        </p:spPr>
+        <p:style>
+          <a:lnRef idx="2">
+            <a:schemeClr val="dk1"/>
+          </a:lnRef>
+          <a:fillRef idx="1">
+            <a:schemeClr val="lt1"/>
+          </a:fillRef>
+          <a:effectRef idx="0">
+            <a:schemeClr val="dk1"/>
+          </a:effectRef>
+          <a:fontRef idx="minor">
+            <a:schemeClr val="dk1"/>
+          </a:fontRef>
+        </p:style>
+        <p:txBody>
+          <a:bodyPr rtlCol="0" anchor="ctr"/>
+          <a:lstStyle/>
+          <a:p>
+            <a:pPr algn="ctr"/>
+            <a:endParaRPr lang="ko-KR" altLang="en-US" sz="800" dirty="0"/>
+          </a:p>
+        </p:txBody>
+      </p:sp>
+      <p:sp>
+        <p:nvSpPr>
+          <p:cNvPr id="5" name="직사각형 4"/>
+          <p:cNvSpPr/>
+          <p:nvPr/>
+        </p:nvSpPr>
+        <p:spPr>
+          <a:xfrm>
+            <a:off x="3002693" y="4284521"/>
+            <a:ext cx="825644" cy="430161"/>
+          </a:xfrm>
+          <a:prstGeom prst="rect">
+            <a:avLst/>
+          </a:prstGeom>
+        </p:spPr>
+        <p:style>
+          <a:lnRef idx="2">
+            <a:schemeClr val="dk1"/>
+          </a:lnRef>
+          <a:fillRef idx="1">
+            <a:schemeClr val="lt1"/>
+          </a:fillRef>
+          <a:effectRef idx="0">
+            <a:schemeClr val="dk1"/>
+          </a:effectRef>
+          <a:fontRef idx="minor">
+            <a:schemeClr val="dk1"/>
+          </a:fontRef>
+        </p:style>
+        <p:txBody>
+          <a:bodyPr rtlCol="0" anchor="ctr"/>
+          <a:lstStyle/>
+          <a:p>
+            <a:pPr algn="ctr"/>
+            <a:r>
+              <a:rPr lang="en-US" altLang="ko-KR" sz="1100" dirty="0" smtClean="0"/>
+              <a:t>Feature Extraction</a:t>
+            </a:r>
+            <a:endParaRPr lang="ko-KR" altLang="en-US" sz="1100" dirty="0"/>
+          </a:p>
+        </p:txBody>
+      </p:sp>
+      <p:sp>
+        <p:nvSpPr>
+          <p:cNvPr id="6" name="직사각형 5"/>
+          <p:cNvSpPr/>
+          <p:nvPr/>
+        </p:nvSpPr>
+        <p:spPr>
+          <a:xfrm>
+            <a:off x="3828337" y="3426694"/>
+            <a:ext cx="825644" cy="430161"/>
+          </a:xfrm>
+          <a:prstGeom prst="rect">
+            <a:avLst/>
+          </a:prstGeom>
+        </p:spPr>
+        <p:style>
+          <a:lnRef idx="2">
+            <a:schemeClr val="dk1"/>
+          </a:lnRef>
+          <a:fillRef idx="1">
+            <a:schemeClr val="lt1"/>
+          </a:fillRef>
+          <a:effectRef idx="0">
+            <a:schemeClr val="dk1"/>
+          </a:effectRef>
+          <a:fontRef idx="minor">
+            <a:schemeClr val="dk1"/>
+          </a:fontRef>
+        </p:style>
+        <p:txBody>
+          <a:bodyPr rtlCol="0" anchor="ctr"/>
+          <a:lstStyle/>
+          <a:p>
+            <a:pPr algn="ctr"/>
+            <a:r>
+              <a:rPr lang="en-US" altLang="ko-KR" sz="1100" dirty="0" smtClean="0"/>
+              <a:t>Clustering</a:t>
+            </a:r>
+            <a:endParaRPr lang="ko-KR" altLang="en-US" sz="1100" dirty="0"/>
+          </a:p>
+        </p:txBody>
+      </p:sp>
+      <p:sp>
+        <p:nvSpPr>
+          <p:cNvPr id="7" name="직사각형 6"/>
+          <p:cNvSpPr/>
+          <p:nvPr/>
+        </p:nvSpPr>
+        <p:spPr>
+          <a:xfrm>
+            <a:off x="4653981" y="4284521"/>
+            <a:ext cx="1042868" cy="430161"/>
+          </a:xfrm>
+          <a:prstGeom prst="rect">
+            <a:avLst/>
+          </a:prstGeom>
+        </p:spPr>
+        <p:style>
+          <a:lnRef idx="2">
+            <a:schemeClr val="dk1"/>
+          </a:lnRef>
+          <a:fillRef idx="1">
+            <a:schemeClr val="lt1"/>
+          </a:fillRef>
+          <a:effectRef idx="0">
+            <a:schemeClr val="dk1"/>
+          </a:effectRef>
+          <a:fontRef idx="minor">
+            <a:schemeClr val="dk1"/>
+          </a:fontRef>
+        </p:style>
+        <p:txBody>
+          <a:bodyPr rtlCol="0" anchor="ctr"/>
+          <a:lstStyle/>
+          <a:p>
+            <a:pPr algn="ctr"/>
+            <a:r>
+              <a:rPr lang="en-US" altLang="ko-KR" sz="1100" dirty="0" smtClean="0"/>
+              <a:t>Pulse Pattern Extraction</a:t>
+            </a:r>
+            <a:endParaRPr lang="ko-KR" altLang="en-US" sz="1100" dirty="0"/>
+          </a:p>
+        </p:txBody>
+      </p:sp>
+      <p:sp>
+        <p:nvSpPr>
+          <p:cNvPr id="8" name="직사각형 7"/>
+          <p:cNvSpPr/>
+          <p:nvPr/>
+        </p:nvSpPr>
+        <p:spPr>
+          <a:xfrm>
+            <a:off x="5843034" y="3426694"/>
+            <a:ext cx="1092835" cy="430161"/>
+          </a:xfrm>
+          <a:prstGeom prst="rect">
+            <a:avLst/>
+          </a:prstGeom>
+        </p:spPr>
+        <p:style>
+          <a:lnRef idx="2">
+            <a:schemeClr val="dk1"/>
+          </a:lnRef>
+          <a:fillRef idx="1">
+            <a:schemeClr val="lt1"/>
+          </a:fillRef>
+          <a:effectRef idx="0">
+            <a:schemeClr val="dk1"/>
+          </a:effectRef>
+          <a:fontRef idx="minor">
+            <a:schemeClr val="dk1"/>
+          </a:fontRef>
+        </p:style>
+        <p:txBody>
+          <a:bodyPr rtlCol="0" anchor="ctr"/>
+          <a:lstStyle/>
+          <a:p>
+            <a:pPr algn="ctr"/>
+            <a:r>
+              <a:rPr lang="en-US" altLang="ko-KR" sz="1100" dirty="0" smtClean="0"/>
+              <a:t>Radar Pattern Classification</a:t>
+            </a:r>
+            <a:endParaRPr lang="ko-KR" altLang="en-US" sz="1100" dirty="0"/>
+          </a:p>
+        </p:txBody>
+      </p:sp>
+      <p:sp>
+        <p:nvSpPr>
+          <p:cNvPr id="9" name="직사각형 8"/>
+          <p:cNvSpPr/>
+          <p:nvPr/>
+        </p:nvSpPr>
+        <p:spPr>
+          <a:xfrm>
+            <a:off x="1835254" y="3427839"/>
+            <a:ext cx="1167439" cy="430161"/>
+          </a:xfrm>
+          <a:prstGeom prst="rect">
+            <a:avLst/>
+          </a:prstGeom>
+        </p:spPr>
+        <p:style>
+          <a:lnRef idx="2">
+            <a:schemeClr val="dk1"/>
+          </a:lnRef>
+          <a:fillRef idx="1">
+            <a:schemeClr val="lt1"/>
+          </a:fillRef>
+          <a:effectRef idx="0">
+            <a:schemeClr val="dk1"/>
+          </a:effectRef>
+          <a:fontRef idx="minor">
+            <a:schemeClr val="dk1"/>
+          </a:fontRef>
+        </p:style>
+        <p:txBody>
+          <a:bodyPr rtlCol="0" anchor="ctr"/>
+          <a:lstStyle/>
+          <a:p>
+            <a:pPr algn="ctr"/>
+            <a:r>
+              <a:rPr lang="en-US" altLang="ko-KR" sz="1100" dirty="0" smtClean="0"/>
+              <a:t>Radar Receiver</a:t>
+            </a:r>
+            <a:endParaRPr lang="ko-KR" altLang="en-US" sz="1100" dirty="0"/>
+          </a:p>
+        </p:txBody>
+      </p:sp>
+      <p:cxnSp>
+        <p:nvCxnSpPr>
+          <p:cNvPr id="13" name="꺾인 연결선 12"/>
+          <p:cNvCxnSpPr>
+            <a:stCxn id="9" idx="2"/>
+            <a:endCxn id="5" idx="1"/>
+          </p:cNvCxnSpPr>
+          <p:nvPr/>
+        </p:nvCxnSpPr>
+        <p:spPr>
+          <a:xfrm rot="16200000" flipH="1">
+            <a:off x="2390032" y="3886941"/>
+            <a:ext cx="641602" cy="583719"/>
+          </a:xfrm>
+          <a:prstGeom prst="bentConnector2">
+            <a:avLst/>
+          </a:prstGeom>
+          <a:ln w="19050">
+            <a:tailEnd type="triangle"/>
+          </a:ln>
+        </p:spPr>
+        <p:style>
+          <a:lnRef idx="1">
+            <a:schemeClr val="dk1"/>
+          </a:lnRef>
+          <a:fillRef idx="0">
+            <a:schemeClr val="dk1"/>
+          </a:fillRef>
+          <a:effectRef idx="0">
+            <a:schemeClr val="dk1"/>
+          </a:effectRef>
+          <a:fontRef idx="minor">
+            <a:schemeClr val="tx1"/>
+          </a:fontRef>
+        </p:style>
+      </p:cxnSp>
+      <p:cxnSp>
+        <p:nvCxnSpPr>
+          <p:cNvPr id="14" name="꺾인 연결선 13"/>
+          <p:cNvCxnSpPr>
+            <a:stCxn id="5" idx="0"/>
+            <a:endCxn id="6" idx="1"/>
+          </p:cNvCxnSpPr>
+          <p:nvPr/>
+        </p:nvCxnSpPr>
+        <p:spPr>
+          <a:xfrm rot="5400000" flipH="1" flipV="1">
+            <a:off x="3300553" y="3756737"/>
+            <a:ext cx="642746" cy="412822"/>
+          </a:xfrm>
+          <a:prstGeom prst="bentConnector2">
+            <a:avLst/>
+          </a:prstGeom>
+          <a:ln w="19050">
+            <a:tailEnd type="triangle"/>
+          </a:ln>
+        </p:spPr>
+        <p:style>
+          <a:lnRef idx="1">
+            <a:schemeClr val="dk1"/>
+          </a:lnRef>
+          <a:fillRef idx="0">
+            <a:schemeClr val="dk1"/>
+          </a:fillRef>
+          <a:effectRef idx="0">
+            <a:schemeClr val="dk1"/>
+          </a:effectRef>
+          <a:fontRef idx="minor">
+            <a:schemeClr val="tx1"/>
+          </a:fontRef>
+        </p:style>
+      </p:cxnSp>
+      <p:cxnSp>
+        <p:nvCxnSpPr>
+          <p:cNvPr id="18" name="꺾인 연결선 17"/>
+          <p:cNvCxnSpPr>
+            <a:stCxn id="6" idx="2"/>
+            <a:endCxn id="7" idx="1"/>
+          </p:cNvCxnSpPr>
+          <p:nvPr/>
+        </p:nvCxnSpPr>
+        <p:spPr>
+          <a:xfrm rot="16200000" flipH="1">
+            <a:off x="4126197" y="3971817"/>
+            <a:ext cx="642747" cy="412822"/>
+          </a:xfrm>
+          <a:prstGeom prst="bentConnector2">
+            <a:avLst/>
+          </a:prstGeom>
+          <a:ln w="19050">
+            <a:tailEnd type="triangle"/>
+          </a:ln>
+        </p:spPr>
+        <p:style>
+          <a:lnRef idx="1">
+            <a:schemeClr val="dk1"/>
+          </a:lnRef>
+          <a:fillRef idx="0">
+            <a:schemeClr val="dk1"/>
+          </a:fillRef>
+          <a:effectRef idx="0">
+            <a:schemeClr val="dk1"/>
+          </a:effectRef>
+          <a:fontRef idx="minor">
+            <a:schemeClr val="tx1"/>
+          </a:fontRef>
+        </p:style>
+      </p:cxnSp>
+      <p:cxnSp>
+        <p:nvCxnSpPr>
+          <p:cNvPr id="21" name="꺾인 연결선 20"/>
+          <p:cNvCxnSpPr>
+            <a:stCxn id="7" idx="0"/>
+            <a:endCxn id="8" idx="1"/>
+          </p:cNvCxnSpPr>
+          <p:nvPr/>
+        </p:nvCxnSpPr>
+        <p:spPr>
+          <a:xfrm rot="5400000" flipH="1" flipV="1">
+            <a:off x="5187851" y="3629339"/>
+            <a:ext cx="642746" cy="667619"/>
+          </a:xfrm>
+          <a:prstGeom prst="bentConnector2">
+            <a:avLst/>
+          </a:prstGeom>
+          <a:ln w="19050">
+            <a:tailEnd type="triangle"/>
+          </a:ln>
+        </p:spPr>
+        <p:style>
+          <a:lnRef idx="1">
+            <a:schemeClr val="dk1"/>
+          </a:lnRef>
+          <a:fillRef idx="0">
+            <a:schemeClr val="dk1"/>
+          </a:fillRef>
+          <a:effectRef idx="0">
+            <a:schemeClr val="dk1"/>
+          </a:effectRef>
+          <a:fontRef idx="minor">
+            <a:schemeClr val="tx1"/>
+          </a:fontRef>
+        </p:style>
+      </p:cxnSp>
+      <p:sp>
+        <p:nvSpPr>
+          <p:cNvPr id="24" name="TextBox 23"/>
+          <p:cNvSpPr txBox="1"/>
+          <p:nvPr/>
+        </p:nvSpPr>
+        <p:spPr>
+          <a:xfrm>
+            <a:off x="1988696" y="4499601"/>
+            <a:ext cx="376706" cy="323165"/>
+          </a:xfrm>
+          <a:prstGeom prst="rect">
+            <a:avLst/>
+          </a:prstGeom>
+          <a:noFill/>
+        </p:spPr>
+        <p:txBody>
+          <a:bodyPr wrap="none" lIns="0" tIns="0" rIns="0" bIns="0" rtlCol="0">
+            <a:spAutoFit/>
+          </a:bodyPr>
+          <a:lstStyle/>
+          <a:p>
+            <a:r>
+              <a:rPr lang="en-US" altLang="ko-KR" sz="1050" dirty="0" smtClean="0"/>
+              <a:t>Radar</a:t>
+            </a:r>
+          </a:p>
+          <a:p>
+            <a:r>
+              <a:rPr lang="en-US" altLang="ko-KR" sz="1050" dirty="0" smtClean="0"/>
+              <a:t>Pulses</a:t>
+            </a:r>
+          </a:p>
+        </p:txBody>
+      </p:sp>
+      <p:sp>
+        <p:nvSpPr>
+          <p:cNvPr id="25" name="TextBox 24"/>
+          <p:cNvSpPr txBox="1"/>
+          <p:nvPr/>
+        </p:nvSpPr>
+        <p:spPr>
+          <a:xfrm>
+            <a:off x="4769209" y="3233889"/>
+            <a:ext cx="958596" cy="323165"/>
+          </a:xfrm>
+          <a:prstGeom prst="rect">
+            <a:avLst/>
+          </a:prstGeom>
+          <a:noFill/>
+        </p:spPr>
+        <p:txBody>
+          <a:bodyPr wrap="none" lIns="0" tIns="0" rIns="0" bIns="0" rtlCol="0">
+            <a:spAutoFit/>
+          </a:bodyPr>
+          <a:lstStyle/>
+          <a:p>
+            <a:r>
+              <a:rPr lang="en-US" altLang="ko-KR" sz="1050" dirty="0" smtClean="0"/>
+              <a:t>Input Features </a:t>
+            </a:r>
+          </a:p>
+          <a:p>
+            <a:r>
+              <a:rPr lang="en-US" altLang="ko-KR" sz="1050" dirty="0" smtClean="0"/>
+              <a:t>(RF, TOA, PW)</a:t>
+            </a:r>
+          </a:p>
+        </p:txBody>
+      </p:sp>
+    </p:spTree>
+    <p:extLst>
+      <p:ext uri="{BB962C8B-B14F-4D97-AF65-F5344CB8AC3E}">
+        <p14:creationId xmlns:p14="http://schemas.microsoft.com/office/powerpoint/2010/main" val="1044412954"/>
+      </p:ext>
+    </p:extLst>
+  </p:cSld>
+  <p:clrMapOvr>
+    <a:masterClrMapping/>
+  </p:clrMapOvr>
+</p:sld>
+</file>
+
+<file path=ppt/slides/slide3.xml><?xml version="1.0" encoding="utf-8"?>
+<p:sld xmlns:a="http://schemas.openxmlformats.org/drawingml/2006/main" xmlns:r="http://schemas.openxmlformats.org/officeDocument/2006/relationships" xmlns:p="http://schemas.openxmlformats.org/presentationml/2006/main">
+  <p:cSld>
+    <p:spTree>
+      <p:nvGrpSpPr>
+        <p:cNvPr id="1" name=""/>
+        <p:cNvGrpSpPr/>
+        <p:nvPr/>
+      </p:nvGrpSpPr>
+      <p:grpSpPr>
+        <a:xfrm>
+          <a:off x="0" y="0"/>
+          <a:ext cx="0" cy="0"/>
+          <a:chOff x="0" y="0"/>
+          <a:chExt cx="0" cy="0"/>
+        </a:xfrm>
+      </p:grpSpPr>
+      <p:sp>
+        <p:nvSpPr>
+          <p:cNvPr id="4" name="직사각형 3"/>
+          <p:cNvSpPr/>
+          <p:nvPr/>
+        </p:nvSpPr>
+        <p:spPr>
+          <a:xfrm>
+            <a:off x="1333114" y="2918533"/>
+            <a:ext cx="5870873" cy="2613892"/>
+          </a:xfrm>
+          <a:prstGeom prst="rect">
+            <a:avLst/>
+          </a:prstGeom>
+        </p:spPr>
+        <p:style>
+          <a:lnRef idx="2">
+            <a:schemeClr val="dk1"/>
+          </a:lnRef>
+          <a:fillRef idx="1">
+            <a:schemeClr val="lt1"/>
+          </a:fillRef>
+          <a:effectRef idx="0">
+            <a:schemeClr val="dk1"/>
+          </a:effectRef>
+          <a:fontRef idx="minor">
+            <a:schemeClr val="dk1"/>
+          </a:fontRef>
+        </p:style>
+        <p:txBody>
+          <a:bodyPr rtlCol="0" anchor="ctr"/>
+          <a:lstStyle/>
+          <a:p>
+            <a:pPr algn="ctr"/>
+            <a:endParaRPr lang="ko-KR" altLang="en-US" sz="800" dirty="0"/>
+          </a:p>
+        </p:txBody>
+      </p:sp>
+      <p:sp>
+        <p:nvSpPr>
+          <p:cNvPr id="5" name="직사각형 4"/>
+          <p:cNvSpPr/>
+          <p:nvPr/>
+        </p:nvSpPr>
+        <p:spPr>
+          <a:xfrm>
+            <a:off x="4444143" y="3427839"/>
+            <a:ext cx="825644" cy="430161"/>
+          </a:xfrm>
+          <a:prstGeom prst="rect">
+            <a:avLst/>
+          </a:prstGeom>
+        </p:spPr>
+        <p:style>
+          <a:lnRef idx="2">
+            <a:schemeClr val="dk1"/>
+          </a:lnRef>
+          <a:fillRef idx="1">
+            <a:schemeClr val="lt1"/>
+          </a:fillRef>
+          <a:effectRef idx="0">
+            <a:schemeClr val="dk1"/>
+          </a:effectRef>
+          <a:fontRef idx="minor">
+            <a:schemeClr val="dk1"/>
+          </a:fontRef>
+        </p:style>
+        <p:txBody>
+          <a:bodyPr rtlCol="0" anchor="ctr"/>
+          <a:lstStyle/>
+          <a:p>
+            <a:pPr algn="ctr"/>
+            <a:r>
+              <a:rPr lang="en-US" altLang="ko-KR" sz="1100" dirty="0" smtClean="0"/>
+              <a:t>Feature Extraction</a:t>
+            </a:r>
+            <a:endParaRPr lang="ko-KR" altLang="en-US" sz="1100" dirty="0"/>
+          </a:p>
+        </p:txBody>
+      </p:sp>
+      <p:sp>
+        <p:nvSpPr>
+          <p:cNvPr id="6" name="직사각형 5"/>
+          <p:cNvSpPr/>
+          <p:nvPr/>
+        </p:nvSpPr>
+        <p:spPr>
+          <a:xfrm>
+            <a:off x="5942887" y="4010399"/>
+            <a:ext cx="825644" cy="430161"/>
+          </a:xfrm>
+          <a:prstGeom prst="rect">
+            <a:avLst/>
+          </a:prstGeom>
+        </p:spPr>
+        <p:style>
+          <a:lnRef idx="2">
+            <a:schemeClr val="dk1"/>
+          </a:lnRef>
+          <a:fillRef idx="1">
+            <a:schemeClr val="lt1"/>
+          </a:fillRef>
+          <a:effectRef idx="0">
+            <a:schemeClr val="dk1"/>
+          </a:effectRef>
+          <a:fontRef idx="minor">
+            <a:schemeClr val="dk1"/>
+          </a:fontRef>
+        </p:style>
+        <p:txBody>
+          <a:bodyPr rtlCol="0" anchor="ctr"/>
+          <a:lstStyle/>
+          <a:p>
+            <a:pPr algn="ctr"/>
+            <a:r>
+              <a:rPr lang="en-US" altLang="ko-KR" sz="1100" dirty="0" smtClean="0"/>
+              <a:t>Clustering</a:t>
+            </a:r>
+            <a:endParaRPr lang="ko-KR" altLang="en-US" sz="1100" dirty="0"/>
+          </a:p>
+        </p:txBody>
+      </p:sp>
+      <p:sp>
+        <p:nvSpPr>
+          <p:cNvPr id="7" name="직사각형 6"/>
+          <p:cNvSpPr/>
+          <p:nvPr/>
+        </p:nvSpPr>
+        <p:spPr>
+          <a:xfrm>
+            <a:off x="4335530" y="4527749"/>
+            <a:ext cx="1042868" cy="430161"/>
+          </a:xfrm>
+          <a:prstGeom prst="rect">
+            <a:avLst/>
+          </a:prstGeom>
+        </p:spPr>
+        <p:style>
+          <a:lnRef idx="2">
+            <a:schemeClr val="dk1"/>
+          </a:lnRef>
+          <a:fillRef idx="1">
+            <a:schemeClr val="lt1"/>
+          </a:fillRef>
+          <a:effectRef idx="0">
+            <a:schemeClr val="dk1"/>
+          </a:effectRef>
+          <a:fontRef idx="minor">
+            <a:schemeClr val="dk1"/>
+          </a:fontRef>
+        </p:style>
+        <p:txBody>
+          <a:bodyPr rtlCol="0" anchor="ctr"/>
+          <a:lstStyle/>
+          <a:p>
+            <a:pPr algn="ctr"/>
+            <a:r>
+              <a:rPr lang="en-US" altLang="ko-KR" sz="1100" dirty="0" smtClean="0"/>
+              <a:t>Pulse Pattern Extraction</a:t>
+            </a:r>
+            <a:endParaRPr lang="ko-KR" altLang="en-US" sz="1100" dirty="0"/>
+          </a:p>
+        </p:txBody>
+      </p:sp>
+      <p:sp>
+        <p:nvSpPr>
+          <p:cNvPr id="8" name="직사각형 7"/>
+          <p:cNvSpPr/>
+          <p:nvPr/>
+        </p:nvSpPr>
+        <p:spPr>
+          <a:xfrm>
+            <a:off x="1872555" y="4530907"/>
+            <a:ext cx="1130995" cy="430161"/>
+          </a:xfrm>
+          <a:prstGeom prst="rect">
+            <a:avLst/>
+          </a:prstGeom>
+        </p:spPr>
+        <p:style>
+          <a:lnRef idx="2">
+            <a:schemeClr val="dk1"/>
+          </a:lnRef>
+          <a:fillRef idx="1">
+            <a:schemeClr val="lt1"/>
+          </a:fillRef>
+          <a:effectRef idx="0">
+            <a:schemeClr val="dk1"/>
+          </a:effectRef>
+          <a:fontRef idx="minor">
+            <a:schemeClr val="dk1"/>
+          </a:fontRef>
+        </p:style>
+        <p:txBody>
+          <a:bodyPr rtlCol="0" anchor="ctr"/>
+          <a:lstStyle/>
+          <a:p>
+            <a:pPr algn="ctr"/>
+            <a:r>
+              <a:rPr lang="en-US" altLang="ko-KR" sz="1100" dirty="0" smtClean="0"/>
+              <a:t>Radar Pattern Classification</a:t>
+            </a:r>
+            <a:endParaRPr lang="ko-KR" altLang="en-US" sz="1100" dirty="0"/>
+          </a:p>
+        </p:txBody>
+      </p:sp>
+      <p:sp>
+        <p:nvSpPr>
+          <p:cNvPr id="9" name="직사각형 8"/>
+          <p:cNvSpPr/>
+          <p:nvPr/>
+        </p:nvSpPr>
+        <p:spPr>
+          <a:xfrm>
+            <a:off x="1872555" y="3427839"/>
+            <a:ext cx="1130996" cy="430161"/>
+          </a:xfrm>
+          <a:prstGeom prst="rect">
+            <a:avLst/>
+          </a:prstGeom>
+        </p:spPr>
+        <p:style>
+          <a:lnRef idx="2">
+            <a:schemeClr val="dk1"/>
+          </a:lnRef>
+          <a:fillRef idx="1">
+            <a:schemeClr val="lt1"/>
+          </a:fillRef>
+          <a:effectRef idx="0">
+            <a:schemeClr val="dk1"/>
+          </a:effectRef>
+          <a:fontRef idx="minor">
+            <a:schemeClr val="dk1"/>
+          </a:fontRef>
+        </p:style>
+        <p:txBody>
+          <a:bodyPr rtlCol="0" anchor="ctr"/>
+          <a:lstStyle/>
+          <a:p>
+            <a:pPr algn="ctr"/>
+            <a:r>
+              <a:rPr lang="en-US" altLang="ko-KR" sz="1100" dirty="0" smtClean="0"/>
+              <a:t>Radar Receiver</a:t>
+            </a:r>
+            <a:endParaRPr lang="ko-KR" altLang="en-US" sz="1100" dirty="0"/>
+          </a:p>
+        </p:txBody>
+      </p:sp>
+      <p:cxnSp>
+        <p:nvCxnSpPr>
+          <p:cNvPr id="14" name="꺾인 연결선 13"/>
+          <p:cNvCxnSpPr>
+            <a:stCxn id="5" idx="3"/>
+            <a:endCxn id="6" idx="0"/>
+          </p:cNvCxnSpPr>
+          <p:nvPr/>
+        </p:nvCxnSpPr>
+        <p:spPr>
+          <a:xfrm>
+            <a:off x="5269787" y="3642920"/>
+            <a:ext cx="1085922" cy="367479"/>
+          </a:xfrm>
+          <a:prstGeom prst="bentConnector2">
+            <a:avLst/>
+          </a:prstGeom>
+          <a:ln w="19050">
+            <a:tailEnd type="triangle"/>
+          </a:ln>
+        </p:spPr>
+        <p:style>
+          <a:lnRef idx="1">
+            <a:schemeClr val="dk1"/>
+          </a:lnRef>
+          <a:fillRef idx="0">
+            <a:schemeClr val="dk1"/>
+          </a:fillRef>
+          <a:effectRef idx="0">
+            <a:schemeClr val="dk1"/>
+          </a:effectRef>
+          <a:fontRef idx="minor">
+            <a:schemeClr val="tx1"/>
+          </a:fontRef>
+        </p:style>
+      </p:cxnSp>
+      <p:cxnSp>
+        <p:nvCxnSpPr>
+          <p:cNvPr id="18" name="꺾인 연결선 17"/>
+          <p:cNvCxnSpPr>
+            <a:stCxn id="6" idx="2"/>
+            <a:endCxn id="7" idx="3"/>
+          </p:cNvCxnSpPr>
+          <p:nvPr/>
+        </p:nvCxnSpPr>
+        <p:spPr>
+          <a:xfrm rot="5400000">
+            <a:off x="5715919" y="4103040"/>
+            <a:ext cx="302270" cy="977311"/>
+          </a:xfrm>
+          <a:prstGeom prst="bentConnector2">
+            <a:avLst/>
+          </a:prstGeom>
+          <a:ln w="19050">
+            <a:tailEnd type="triangle"/>
+          </a:ln>
+        </p:spPr>
+        <p:style>
+          <a:lnRef idx="1">
+            <a:schemeClr val="dk1"/>
+          </a:lnRef>
+          <a:fillRef idx="0">
+            <a:schemeClr val="dk1"/>
+          </a:fillRef>
+          <a:effectRef idx="0">
+            <a:schemeClr val="dk1"/>
+          </a:effectRef>
+          <a:fontRef idx="minor">
+            <a:schemeClr val="tx1"/>
+          </a:fontRef>
+        </p:style>
+      </p:cxnSp>
+      <p:sp>
+        <p:nvSpPr>
+          <p:cNvPr id="24" name="TextBox 23"/>
+          <p:cNvSpPr txBox="1"/>
+          <p:nvPr/>
+        </p:nvSpPr>
+        <p:spPr>
+          <a:xfrm>
+            <a:off x="3481187" y="3294520"/>
+            <a:ext cx="376706" cy="323165"/>
+          </a:xfrm>
+          <a:prstGeom prst="rect">
+            <a:avLst/>
+          </a:prstGeom>
+          <a:noFill/>
+        </p:spPr>
+        <p:txBody>
+          <a:bodyPr wrap="none" lIns="0" tIns="0" rIns="0" bIns="0" rtlCol="0">
+            <a:spAutoFit/>
+          </a:bodyPr>
+          <a:lstStyle/>
+          <a:p>
+            <a:r>
+              <a:rPr lang="en-US" altLang="ko-KR" sz="1050" dirty="0" smtClean="0"/>
+              <a:t>Radar</a:t>
+            </a:r>
+          </a:p>
+          <a:p>
+            <a:r>
+              <a:rPr lang="en-US" altLang="ko-KR" sz="1050" dirty="0" smtClean="0"/>
+              <a:t>Pulses</a:t>
+            </a:r>
+          </a:p>
+        </p:txBody>
+      </p:sp>
+      <p:sp>
+        <p:nvSpPr>
+          <p:cNvPr id="25" name="TextBox 24"/>
+          <p:cNvSpPr txBox="1"/>
+          <p:nvPr/>
+        </p:nvSpPr>
+        <p:spPr>
+          <a:xfrm>
+            <a:off x="3244549" y="4369195"/>
+            <a:ext cx="958596" cy="323165"/>
+          </a:xfrm>
+          <a:prstGeom prst="rect">
+            <a:avLst/>
+          </a:prstGeom>
+          <a:noFill/>
+        </p:spPr>
+        <p:txBody>
+          <a:bodyPr wrap="none" lIns="0" tIns="0" rIns="0" bIns="0" rtlCol="0">
+            <a:spAutoFit/>
+          </a:bodyPr>
+          <a:lstStyle/>
+          <a:p>
+            <a:pPr algn="ctr"/>
+            <a:r>
+              <a:rPr lang="en-US" altLang="ko-KR" sz="1050" dirty="0" smtClean="0"/>
+              <a:t>Input Features </a:t>
+            </a:r>
+          </a:p>
+          <a:p>
+            <a:pPr algn="ctr"/>
+            <a:r>
+              <a:rPr lang="en-US" altLang="ko-KR" sz="1050" dirty="0" smtClean="0"/>
+              <a:t>(RF, TOA, PW)</a:t>
+            </a:r>
+          </a:p>
+        </p:txBody>
+      </p:sp>
+      <p:cxnSp>
+        <p:nvCxnSpPr>
+          <p:cNvPr id="32" name="직선 화살표 연결선 31"/>
+          <p:cNvCxnSpPr>
+            <a:stCxn id="9" idx="3"/>
+            <a:endCxn id="5" idx="1"/>
+          </p:cNvCxnSpPr>
+          <p:nvPr/>
+        </p:nvCxnSpPr>
+        <p:spPr>
+          <a:xfrm>
+            <a:off x="3003551" y="3642920"/>
+            <a:ext cx="1440592" cy="0"/>
+          </a:xfrm>
+          <a:prstGeom prst="straightConnector1">
+            <a:avLst/>
+          </a:prstGeom>
+          <a:ln w="19050">
+            <a:tailEnd type="triangle"/>
+          </a:ln>
+        </p:spPr>
+        <p:style>
+          <a:lnRef idx="1">
+            <a:schemeClr val="dk1"/>
+          </a:lnRef>
+          <a:fillRef idx="0">
+            <a:schemeClr val="dk1"/>
+          </a:fillRef>
+          <a:effectRef idx="0">
+            <a:schemeClr val="dk1"/>
+          </a:effectRef>
+          <a:fontRef idx="minor">
+            <a:schemeClr val="tx1"/>
+          </a:fontRef>
+        </p:style>
+      </p:cxnSp>
+      <p:cxnSp>
+        <p:nvCxnSpPr>
+          <p:cNvPr id="33" name="직선 화살표 연결선 32"/>
+          <p:cNvCxnSpPr>
+            <a:stCxn id="7" idx="1"/>
+            <a:endCxn id="8" idx="3"/>
+          </p:cNvCxnSpPr>
+          <p:nvPr/>
+        </p:nvCxnSpPr>
+        <p:spPr>
+          <a:xfrm flipH="1">
+            <a:off x="3003550" y="4742830"/>
+            <a:ext cx="1331980" cy="3158"/>
+          </a:xfrm>
+          <a:prstGeom prst="straightConnector1">
+            <a:avLst/>
+          </a:prstGeom>
+          <a:ln w="19050">
+            <a:tailEnd type="triangle"/>
+          </a:ln>
+        </p:spPr>
+        <p:style>
+          <a:lnRef idx="1">
+            <a:schemeClr val="dk1"/>
+          </a:lnRef>
+          <a:fillRef idx="0">
+            <a:schemeClr val="dk1"/>
+          </a:fillRef>
+          <a:effectRef idx="0">
+            <a:schemeClr val="dk1"/>
+          </a:effectRef>
+          <a:fontRef idx="minor">
+            <a:schemeClr val="tx1"/>
+          </a:fontRef>
+        </p:style>
+      </p:cxnSp>
+    </p:spTree>
+    <p:extLst>
+      <p:ext uri="{BB962C8B-B14F-4D97-AF65-F5344CB8AC3E}">
+        <p14:creationId xmlns:p14="http://schemas.microsoft.com/office/powerpoint/2010/main" val="2299434268"/>
       </p:ext>
     </p:extLst>
   </p:cSld>

</xml_diff>